<commit_message>
finished with the conditional-statements
</commit_message>
<xml_diff>
--- a/JS Fundamentals/3.Conditional-statements/JS-Conditional-statements.pptx
+++ b/JS Fundamentals/3.Conditional-statements/JS-Conditional-statements.pptx
@@ -13,7 +13,12 @@
     <p:sldId id="271" r:id="rId7"/>
     <p:sldId id="272" r:id="rId8"/>
     <p:sldId id="273" r:id="rId9"/>
-    <p:sldId id="266" r:id="rId10"/>
+    <p:sldId id="274" r:id="rId10"/>
+    <p:sldId id="275" r:id="rId11"/>
+    <p:sldId id="276" r:id="rId12"/>
+    <p:sldId id="277" r:id="rId13"/>
+    <p:sldId id="266" r:id="rId14"/>
+    <p:sldId id="278" r:id="rId15"/>
   </p:sldIdLst>
   <p:sldSz cx="12192000" cy="6858000"/>
   <p:notesSz cx="6858000" cy="9144000"/>
@@ -622,7 +627,7 @@
           <a:p>
             <a:fld id="{6F66794D-9D79-4AC5-96DA-597EA4BF2704}" type="datetimeFigureOut">
               <a:rPr lang="en-US" smtClean="0"/>
-              <a:t>01-Apr-16</a:t>
+              <a:t>04-Apr-16</a:t>
             </a:fld>
             <a:endParaRPr lang="en-US"/>
           </a:p>
@@ -955,7 +960,7 @@
           <a:p>
             <a:fld id="{6F66794D-9D79-4AC5-96DA-597EA4BF2704}" type="datetimeFigureOut">
               <a:rPr lang="en-US" smtClean="0"/>
-              <a:t>01-Apr-16</a:t>
+              <a:t>04-Apr-16</a:t>
             </a:fld>
             <a:endParaRPr lang="en-US"/>
           </a:p>
@@ -1203,7 +1208,7 @@
           <a:p>
             <a:fld id="{6F66794D-9D79-4AC5-96DA-597EA4BF2704}" type="datetimeFigureOut">
               <a:rPr lang="en-US" smtClean="0"/>
-              <a:t>01-Apr-16</a:t>
+              <a:t>04-Apr-16</a:t>
             </a:fld>
             <a:endParaRPr lang="en-US"/>
           </a:p>
@@ -1743,7 +1748,7 @@
           <a:p>
             <a:fld id="{6F66794D-9D79-4AC5-96DA-597EA4BF2704}" type="datetimeFigureOut">
               <a:rPr lang="en-US" smtClean="0"/>
-              <a:t>01-Apr-16</a:t>
+              <a:t>04-Apr-16</a:t>
             </a:fld>
             <a:endParaRPr lang="en-US"/>
           </a:p>
@@ -1991,7 +1996,7 @@
           <a:p>
             <a:fld id="{6F66794D-9D79-4AC5-96DA-597EA4BF2704}" type="datetimeFigureOut">
               <a:rPr lang="en-US" smtClean="0"/>
-              <a:t>01-Apr-16</a:t>
+              <a:t>04-Apr-16</a:t>
             </a:fld>
             <a:endParaRPr lang="en-US"/>
           </a:p>
@@ -2523,7 +2528,7 @@
           <a:p>
             <a:fld id="{6F66794D-9D79-4AC5-96DA-597EA4BF2704}" type="datetimeFigureOut">
               <a:rPr lang="en-US" smtClean="0"/>
-              <a:t>01-Apr-16</a:t>
+              <a:t>04-Apr-16</a:t>
             </a:fld>
             <a:endParaRPr lang="en-US"/>
           </a:p>
@@ -2820,7 +2825,7 @@
           <a:p>
             <a:fld id="{6F66794D-9D79-4AC5-96DA-597EA4BF2704}" type="datetimeFigureOut">
               <a:rPr lang="en-US" smtClean="0"/>
-              <a:t>01-Apr-16</a:t>
+              <a:t>04-Apr-16</a:t>
             </a:fld>
             <a:endParaRPr lang="en-US"/>
           </a:p>
@@ -2994,7 +2999,7 @@
           <a:p>
             <a:fld id="{6F66794D-9D79-4AC5-96DA-597EA4BF2704}" type="datetimeFigureOut">
               <a:rPr lang="en-US" smtClean="0"/>
-              <a:t>01-Apr-16</a:t>
+              <a:t>04-Apr-16</a:t>
             </a:fld>
             <a:endParaRPr lang="en-US"/>
           </a:p>
@@ -3174,7 +3179,7 @@
           <a:p>
             <a:fld id="{6F66794D-9D79-4AC5-96DA-597EA4BF2704}" type="datetimeFigureOut">
               <a:rPr lang="en-US" smtClean="0"/>
-              <a:t>01-Apr-16</a:t>
+              <a:t>04-Apr-16</a:t>
             </a:fld>
             <a:endParaRPr lang="en-US"/>
           </a:p>
@@ -3344,7 +3349,7 @@
           <a:p>
             <a:fld id="{6F66794D-9D79-4AC5-96DA-597EA4BF2704}" type="datetimeFigureOut">
               <a:rPr lang="en-US" smtClean="0"/>
-              <a:t>01-Apr-16</a:t>
+              <a:t>04-Apr-16</a:t>
             </a:fld>
             <a:endParaRPr lang="en-US"/>
           </a:p>
@@ -3632,7 +3637,7 @@
           <a:p>
             <a:fld id="{6F66794D-9D79-4AC5-96DA-597EA4BF2704}" type="datetimeFigureOut">
               <a:rPr lang="en-US" smtClean="0"/>
-              <a:t>01-Apr-16</a:t>
+              <a:t>04-Apr-16</a:t>
             </a:fld>
             <a:endParaRPr lang="en-US"/>
           </a:p>
@@ -3936,7 +3941,7 @@
           <a:p>
             <a:fld id="{6F66794D-9D79-4AC5-96DA-597EA4BF2704}" type="datetimeFigureOut">
               <a:rPr lang="en-US" smtClean="0"/>
-              <a:t>01-Apr-16</a:t>
+              <a:t>04-Apr-16</a:t>
             </a:fld>
             <a:endParaRPr lang="en-US"/>
           </a:p>
@@ -4415,7 +4420,7 @@
           <a:p>
             <a:fld id="{6F66794D-9D79-4AC5-96DA-597EA4BF2704}" type="datetimeFigureOut">
               <a:rPr lang="en-US" smtClean="0"/>
-              <a:t>01-Apr-16</a:t>
+              <a:t>04-Apr-16</a:t>
             </a:fld>
             <a:endParaRPr lang="en-US"/>
           </a:p>
@@ -4570,7 +4575,7 @@
           <a:p>
             <a:fld id="{6F66794D-9D79-4AC5-96DA-597EA4BF2704}" type="datetimeFigureOut">
               <a:rPr lang="en-US" smtClean="0"/>
-              <a:t>01-Apr-16</a:t>
+              <a:t>04-Apr-16</a:t>
             </a:fld>
             <a:endParaRPr lang="en-US"/>
           </a:p>
@@ -4665,7 +4670,7 @@
           <a:p>
             <a:fld id="{6F66794D-9D79-4AC5-96DA-597EA4BF2704}" type="datetimeFigureOut">
               <a:rPr lang="en-US" smtClean="0"/>
-              <a:t>01-Apr-16</a:t>
+              <a:t>04-Apr-16</a:t>
             </a:fld>
             <a:endParaRPr lang="en-US"/>
           </a:p>
@@ -4948,7 +4953,7 @@
           <a:p>
             <a:fld id="{6F66794D-9D79-4AC5-96DA-597EA4BF2704}" type="datetimeFigureOut">
               <a:rPr lang="en-US" smtClean="0"/>
-              <a:t>01-Apr-16</a:t>
+              <a:t>04-Apr-16</a:t>
             </a:fld>
             <a:endParaRPr lang="en-US"/>
           </a:p>
@@ -5239,7 +5244,7 @@
           <a:p>
             <a:fld id="{6F66794D-9D79-4AC5-96DA-597EA4BF2704}" type="datetimeFigureOut">
               <a:rPr lang="en-US" smtClean="0"/>
-              <a:t>01-Apr-16</a:t>
+              <a:t>04-Apr-16</a:t>
             </a:fld>
             <a:endParaRPr lang="en-US"/>
           </a:p>
@@ -5769,7 +5774,7 @@
           <a:p>
             <a:fld id="{6F66794D-9D79-4AC5-96DA-597EA4BF2704}" type="datetimeFigureOut">
               <a:rPr lang="en-US" smtClean="0"/>
-              <a:t>01-Apr-16</a:t>
+              <a:t>04-Apr-16</a:t>
             </a:fld>
             <a:endParaRPr lang="en-US"/>
           </a:p>
@@ -6409,6 +6414,1115 @@
 </p:sld>
 </file>
 
+<file path=ppt/slides/slide10.xml><?xml version="1.0" encoding="utf-8"?>
+<p:sld xmlns:a="http://schemas.openxmlformats.org/drawingml/2006/main" xmlns:r="http://schemas.openxmlformats.org/officeDocument/2006/relationships" xmlns:p="http://schemas.openxmlformats.org/presentationml/2006/main">
+  <p:cSld>
+    <p:spTree>
+      <p:nvGrpSpPr>
+        <p:cNvPr id="1" name=""/>
+        <p:cNvGrpSpPr/>
+        <p:nvPr/>
+      </p:nvGrpSpPr>
+      <p:grpSpPr>
+        <a:xfrm>
+          <a:off x="0" y="0"/>
+          <a:ext cx="0" cy="0"/>
+          <a:chOff x="0" y="0"/>
+          <a:chExt cx="0" cy="0"/>
+        </a:xfrm>
+      </p:grpSpPr>
+      <p:sp>
+        <p:nvSpPr>
+          <p:cNvPr id="2" name="Title 1"/>
+          <p:cNvSpPr>
+            <a:spLocks noGrp="1"/>
+          </p:cNvSpPr>
+          <p:nvPr>
+            <p:ph type="title"/>
+          </p:nvPr>
+        </p:nvSpPr>
+        <p:spPr/>
+        <p:txBody>
+          <a:bodyPr/>
+          <a:lstStyle/>
+          <a:p>
+            <a:r>
+              <a:rPr lang="en-US" i="1" dirty="0" smtClean="0">
+                <a:solidFill>
+                  <a:schemeClr val="accent6">
+                    <a:lumMod val="75000"/>
+                  </a:schemeClr>
+                </a:solidFill>
+              </a:rPr>
+              <a:t>switch-case</a:t>
+            </a:r>
+            <a:r>
+              <a:rPr lang="en-US" dirty="0" smtClean="0"/>
+              <a:t> </a:t>
+            </a:r>
+            <a:r>
+              <a:rPr lang="bg-BG" dirty="0" smtClean="0"/>
+              <a:t>конструкция</a:t>
+            </a:r>
+            <a:endParaRPr lang="en-US" dirty="0"/>
+          </a:p>
+        </p:txBody>
+      </p:sp>
+      <p:sp>
+        <p:nvSpPr>
+          <p:cNvPr id="3" name="Content Placeholder 2"/>
+          <p:cNvSpPr>
+            <a:spLocks noGrp="1"/>
+          </p:cNvSpPr>
+          <p:nvPr>
+            <p:ph idx="1"/>
+          </p:nvPr>
+        </p:nvSpPr>
+        <p:spPr/>
+        <p:txBody>
+          <a:bodyPr>
+            <a:normAutofit fontScale="92500" lnSpcReduction="20000"/>
+          </a:bodyPr>
+          <a:lstStyle/>
+          <a:p>
+            <a:r>
+              <a:rPr lang="bg-BG" dirty="0" smtClean="0"/>
+              <a:t>Позволява ни да правим редица сравнения наведнъж</a:t>
+            </a:r>
+          </a:p>
+          <a:p>
+            <a:r>
+              <a:rPr lang="bg-BG" dirty="0" smtClean="0"/>
+              <a:t>Съдържа списък от действия и конкретни условия, при които да се изпълнят</a:t>
+            </a:r>
+            <a:endParaRPr lang="en-US" dirty="0" smtClean="0"/>
+          </a:p>
+          <a:p>
+            <a:r>
+              <a:rPr lang="bg-BG" dirty="0" smtClean="0"/>
+              <a:t>Оценява се отгоре надолу, т.е. кодът, който се намира в 1вото вярно твърдение, ще бъде изпълнен пръв</a:t>
+            </a:r>
+          </a:p>
+          <a:p>
+            <a:r>
+              <a:rPr lang="bg-BG" dirty="0" smtClean="0"/>
+              <a:t>Може да има дефолтно поведение</a:t>
+            </a:r>
+          </a:p>
+          <a:p>
+            <a:r>
+              <a:rPr lang="en-US" i="1" dirty="0" smtClean="0">
+                <a:solidFill>
+                  <a:schemeClr val="accent6">
+                    <a:lumMod val="75000"/>
+                  </a:schemeClr>
+                </a:solidFill>
+              </a:rPr>
+              <a:t>Case</a:t>
+            </a:r>
+            <a:r>
+              <a:rPr lang="bg-BG" dirty="0" smtClean="0"/>
+              <a:t>-овете трябва да бъдат константи стойности</a:t>
+            </a:r>
+          </a:p>
+          <a:p>
+            <a:r>
+              <a:rPr lang="bg-BG" dirty="0" smtClean="0"/>
+              <a:t>Всеки </a:t>
+            </a:r>
+            <a:r>
+              <a:rPr lang="en-US" i="1" dirty="0" smtClean="0">
+                <a:solidFill>
+                  <a:schemeClr val="accent6">
+                    <a:lumMod val="75000"/>
+                  </a:schemeClr>
+                </a:solidFill>
+              </a:rPr>
+              <a:t>case</a:t>
+            </a:r>
+            <a:r>
+              <a:rPr lang="bg-BG" dirty="0" smtClean="0">
+                <a:solidFill>
+                  <a:schemeClr val="accent6">
+                    <a:lumMod val="75000"/>
+                  </a:schemeClr>
+                </a:solidFill>
+              </a:rPr>
+              <a:t> </a:t>
+            </a:r>
+            <a:r>
+              <a:rPr lang="bg-BG" dirty="0" smtClean="0"/>
+              <a:t>трябва да бъде прекъснат </a:t>
+            </a:r>
+            <a:r>
+              <a:rPr lang="en-US" dirty="0" smtClean="0"/>
+              <a:t>(</a:t>
+            </a:r>
+            <a:r>
+              <a:rPr lang="en-US" i="1" dirty="0" smtClean="0">
+                <a:solidFill>
+                  <a:schemeClr val="accent6">
+                    <a:lumMod val="75000"/>
+                  </a:schemeClr>
+                </a:solidFill>
+              </a:rPr>
+              <a:t>break</a:t>
+            </a:r>
+            <a:r>
+              <a:rPr lang="en-US" dirty="0" smtClean="0">
+                <a:solidFill>
+                  <a:schemeClr val="accent6">
+                    <a:lumMod val="75000"/>
+                  </a:schemeClr>
+                </a:solidFill>
+              </a:rPr>
+              <a:t> </a:t>
+            </a:r>
+            <a:r>
+              <a:rPr lang="bg-BG" dirty="0" smtClean="0"/>
+              <a:t>или </a:t>
+            </a:r>
+            <a:r>
+              <a:rPr lang="en-US" i="1" dirty="0" smtClean="0">
+                <a:solidFill>
+                  <a:schemeClr val="accent6">
+                    <a:lumMod val="75000"/>
+                  </a:schemeClr>
+                </a:solidFill>
+              </a:rPr>
+              <a:t>return</a:t>
+            </a:r>
+            <a:r>
+              <a:rPr lang="bg-BG" dirty="0" smtClean="0"/>
+              <a:t>), в противен случай кода продължава изпълнението си надолу</a:t>
+            </a:r>
+            <a:endParaRPr lang="en-US" dirty="0"/>
+          </a:p>
+        </p:txBody>
+      </p:sp>
+      <p:pic>
+        <p:nvPicPr>
+          <p:cNvPr id="4" name="Picture 3"/>
+          <p:cNvPicPr>
+            <a:picLocks noChangeAspect="1"/>
+          </p:cNvPicPr>
+          <p:nvPr/>
+        </p:nvPicPr>
+        <p:blipFill>
+          <a:blip r:embed="rId2" cstate="print">
+            <a:extLst>
+              <a:ext uri="{28A0092B-C50C-407E-A947-70E740481C1C}">
+                <a14:useLocalDpi xmlns:a14="http://schemas.microsoft.com/office/drawing/2010/main" val="0"/>
+              </a:ext>
+            </a:extLst>
+          </a:blip>
+          <a:stretch>
+            <a:fillRect/>
+          </a:stretch>
+        </p:blipFill>
+        <p:spPr>
+          <a:xfrm>
+            <a:off x="8703075" y="4953092"/>
+            <a:ext cx="3488925" cy="2133415"/>
+          </a:xfrm>
+          <a:prstGeom prst="rect">
+            <a:avLst/>
+          </a:prstGeom>
+        </p:spPr>
+      </p:pic>
+    </p:spTree>
+    <p:extLst>
+      <p:ext uri="{BB962C8B-B14F-4D97-AF65-F5344CB8AC3E}">
+        <p14:creationId xmlns:p14="http://schemas.microsoft.com/office/powerpoint/2010/main" val="3242471727"/>
+      </p:ext>
+    </p:extLst>
+  </p:cSld>
+  <p:clrMapOvr>
+    <a:masterClrMapping/>
+  </p:clrMapOvr>
+</p:sld>
+</file>
+
+<file path=ppt/slides/slide11.xml><?xml version="1.0" encoding="utf-8"?>
+<p:sld xmlns:a="http://schemas.openxmlformats.org/drawingml/2006/main" xmlns:r="http://schemas.openxmlformats.org/officeDocument/2006/relationships" xmlns:p="http://schemas.openxmlformats.org/presentationml/2006/main">
+  <p:cSld>
+    <p:spTree>
+      <p:nvGrpSpPr>
+        <p:cNvPr id="1" name=""/>
+        <p:cNvGrpSpPr/>
+        <p:nvPr/>
+      </p:nvGrpSpPr>
+      <p:grpSpPr>
+        <a:xfrm>
+          <a:off x="0" y="0"/>
+          <a:ext cx="0" cy="0"/>
+          <a:chOff x="0" y="0"/>
+          <a:chExt cx="0" cy="0"/>
+        </a:xfrm>
+      </p:grpSpPr>
+      <p:sp>
+        <p:nvSpPr>
+          <p:cNvPr id="2" name="Title 1"/>
+          <p:cNvSpPr>
+            <a:spLocks noGrp="1"/>
+          </p:cNvSpPr>
+          <p:nvPr>
+            <p:ph type="title"/>
+          </p:nvPr>
+        </p:nvSpPr>
+        <p:spPr/>
+        <p:txBody>
+          <a:bodyPr/>
+          <a:lstStyle/>
+          <a:p>
+            <a:r>
+              <a:rPr lang="en-US" i="1" dirty="0" smtClean="0">
+                <a:solidFill>
+                  <a:schemeClr val="accent6">
+                    <a:lumMod val="75000"/>
+                  </a:schemeClr>
+                </a:solidFill>
+              </a:rPr>
+              <a:t>switch-case</a:t>
+            </a:r>
+            <a:r>
+              <a:rPr lang="en-US" dirty="0" smtClean="0"/>
+              <a:t> </a:t>
+            </a:r>
+            <a:r>
+              <a:rPr lang="bg-BG" dirty="0" smtClean="0"/>
+              <a:t>конструкция(1)</a:t>
+            </a:r>
+            <a:endParaRPr lang="en-US" dirty="0"/>
+          </a:p>
+        </p:txBody>
+      </p:sp>
+      <p:sp>
+        <p:nvSpPr>
+          <p:cNvPr id="3" name="Content Placeholder 2"/>
+          <p:cNvSpPr>
+            <a:spLocks noGrp="1"/>
+          </p:cNvSpPr>
+          <p:nvPr>
+            <p:ph sz="half" idx="1"/>
+          </p:nvPr>
+        </p:nvSpPr>
+        <p:spPr/>
+        <p:txBody>
+          <a:bodyPr>
+            <a:normAutofit/>
+          </a:bodyPr>
+          <a:lstStyle/>
+          <a:p>
+            <a:pPr algn="just"/>
+            <a:r>
+              <a:rPr lang="bg-BG" dirty="0" smtClean="0"/>
+              <a:t>В </a:t>
+            </a:r>
+            <a:r>
+              <a:rPr lang="en-US" dirty="0" smtClean="0"/>
+              <a:t>JS</a:t>
+            </a:r>
+            <a:r>
+              <a:rPr lang="bg-BG" dirty="0" smtClean="0"/>
+              <a:t> се поддържа т.нар. </a:t>
+            </a:r>
+            <a:r>
+              <a:rPr lang="en-US" dirty="0" smtClean="0"/>
+              <a:t>fall-through</a:t>
+            </a:r>
+            <a:r>
+              <a:rPr lang="bg-BG" dirty="0" smtClean="0"/>
+              <a:t> поведение, т.е. ако дадено услови</a:t>
+            </a:r>
+            <a:r>
+              <a:rPr lang="en-US" dirty="0" smtClean="0"/>
+              <a:t>e</a:t>
+            </a:r>
+            <a:r>
+              <a:rPr lang="bg-BG" dirty="0" smtClean="0"/>
+              <a:t> е пропуснато се оценява до най-близкия </a:t>
+            </a:r>
+            <a:r>
+              <a:rPr lang="en-US" i="1" dirty="0" smtClean="0">
+                <a:solidFill>
+                  <a:schemeClr val="accent6">
+                    <a:lumMod val="75000"/>
+                  </a:schemeClr>
+                </a:solidFill>
+              </a:rPr>
+              <a:t>break/return</a:t>
+            </a:r>
+          </a:p>
+          <a:p>
+            <a:pPr algn="just"/>
+            <a:r>
+              <a:rPr lang="en-US" i="1" dirty="0" smtClean="0">
+                <a:solidFill>
+                  <a:schemeClr val="accent6">
+                    <a:lumMod val="75000"/>
+                  </a:schemeClr>
+                </a:solidFill>
+              </a:rPr>
+              <a:t>switch/case</a:t>
+            </a:r>
+            <a:r>
+              <a:rPr lang="en-US" dirty="0" smtClean="0"/>
+              <a:t> </a:t>
+            </a:r>
+            <a:r>
+              <a:rPr lang="bg-BG" dirty="0" smtClean="0"/>
+              <a:t>конструкцията не се счита за добър подход и се препоръчва да не се използа</a:t>
+            </a:r>
+          </a:p>
+          <a:p>
+            <a:pPr algn="just"/>
+            <a:r>
+              <a:rPr lang="bg-BG" dirty="0" smtClean="0"/>
+              <a:t>Води до усложнено четене на кода</a:t>
+            </a:r>
+            <a:endParaRPr lang="en-US" dirty="0"/>
+          </a:p>
+        </p:txBody>
+      </p:sp>
+      <p:sp>
+        <p:nvSpPr>
+          <p:cNvPr id="10" name="TextBox 9"/>
+          <p:cNvSpPr txBox="1"/>
+          <p:nvPr/>
+        </p:nvSpPr>
+        <p:spPr>
+          <a:xfrm>
+            <a:off x="7150613" y="2666999"/>
+            <a:ext cx="4505768" cy="2862322"/>
+          </a:xfrm>
+          <a:prstGeom prst="rect">
+            <a:avLst/>
+          </a:prstGeom>
+        </p:spPr>
+        <p:style>
+          <a:lnRef idx="0">
+            <a:schemeClr val="accent1"/>
+          </a:lnRef>
+          <a:fillRef idx="3">
+            <a:schemeClr val="accent1"/>
+          </a:fillRef>
+          <a:effectRef idx="3">
+            <a:schemeClr val="accent1"/>
+          </a:effectRef>
+          <a:fontRef idx="minor">
+            <a:schemeClr val="lt1"/>
+          </a:fontRef>
+        </p:style>
+        <p:txBody>
+          <a:bodyPr wrap="square" rtlCol="0">
+            <a:spAutoFit/>
+          </a:bodyPr>
+          <a:lstStyle/>
+          <a:p>
+            <a:r>
+              <a:rPr lang="en-US" dirty="0"/>
+              <a:t>switch (day) </a:t>
+            </a:r>
+            <a:r>
+              <a:rPr lang="en-US" dirty="0" smtClean="0"/>
+              <a:t>{</a:t>
+            </a:r>
+            <a:endParaRPr lang="bg-BG" dirty="0" smtClean="0"/>
+          </a:p>
+          <a:p>
+            <a:r>
+              <a:rPr lang="bg-BG" dirty="0"/>
+              <a:t> </a:t>
+            </a:r>
+            <a:r>
+              <a:rPr lang="bg-BG" dirty="0" smtClean="0"/>
+              <a:t>    </a:t>
+            </a:r>
+            <a:r>
+              <a:rPr lang="en-US" dirty="0" smtClean="0"/>
+              <a:t>case </a:t>
+            </a:r>
+            <a:r>
+              <a:rPr lang="en-US" dirty="0"/>
+              <a:t>1: console.log('Monday'); break; </a:t>
+            </a:r>
+            <a:endParaRPr lang="bg-BG" dirty="0" smtClean="0"/>
+          </a:p>
+          <a:p>
+            <a:r>
+              <a:rPr lang="bg-BG" dirty="0" smtClean="0"/>
+              <a:t>     </a:t>
+            </a:r>
+            <a:r>
+              <a:rPr lang="en-US" dirty="0" smtClean="0"/>
+              <a:t>case </a:t>
+            </a:r>
+            <a:r>
+              <a:rPr lang="en-US" dirty="0"/>
+              <a:t>2: console.log('Tuesday'); break; </a:t>
+            </a:r>
+            <a:endParaRPr lang="bg-BG" dirty="0" smtClean="0"/>
+          </a:p>
+          <a:p>
+            <a:r>
+              <a:rPr lang="bg-BG" dirty="0" smtClean="0"/>
+              <a:t>     </a:t>
+            </a:r>
+            <a:r>
+              <a:rPr lang="en-US" dirty="0" smtClean="0"/>
+              <a:t>case </a:t>
+            </a:r>
+            <a:r>
+              <a:rPr lang="en-US" dirty="0"/>
+              <a:t>3: console.log('Wednesday'); break</a:t>
+            </a:r>
+            <a:r>
+              <a:rPr lang="en-US" dirty="0" smtClean="0"/>
+              <a:t>;</a:t>
+            </a:r>
+            <a:endParaRPr lang="bg-BG" dirty="0" smtClean="0"/>
+          </a:p>
+          <a:p>
+            <a:r>
+              <a:rPr lang="bg-BG" dirty="0" smtClean="0"/>
+              <a:t>     </a:t>
+            </a:r>
+            <a:r>
+              <a:rPr lang="en-US" dirty="0" smtClean="0"/>
+              <a:t>case </a:t>
+            </a:r>
+            <a:r>
+              <a:rPr lang="en-US" dirty="0"/>
+              <a:t>4: console.log('Thursday'); break; </a:t>
+            </a:r>
+            <a:endParaRPr lang="bg-BG" dirty="0" smtClean="0"/>
+          </a:p>
+          <a:p>
+            <a:r>
+              <a:rPr lang="bg-BG" dirty="0" smtClean="0"/>
+              <a:t>     </a:t>
+            </a:r>
+            <a:r>
+              <a:rPr lang="en-US" dirty="0" smtClean="0"/>
+              <a:t>case </a:t>
+            </a:r>
+            <a:r>
+              <a:rPr lang="en-US" dirty="0"/>
+              <a:t>5: console.log('Friday'); </a:t>
+            </a:r>
+            <a:r>
+              <a:rPr lang="en-US" dirty="0" smtClean="0"/>
+              <a:t>break;</a:t>
+            </a:r>
+            <a:r>
+              <a:rPr lang="bg-BG" dirty="0" smtClean="0"/>
+              <a:t>  </a:t>
+            </a:r>
+          </a:p>
+          <a:p>
+            <a:r>
+              <a:rPr lang="bg-BG" dirty="0" smtClean="0"/>
+              <a:t>     </a:t>
+            </a:r>
+            <a:r>
+              <a:rPr lang="en-US" dirty="0" smtClean="0"/>
+              <a:t>case </a:t>
+            </a:r>
+            <a:r>
+              <a:rPr lang="en-US" dirty="0"/>
+              <a:t>6: console.log('Saturday'); </a:t>
+            </a:r>
+            <a:r>
+              <a:rPr lang="en-US" dirty="0" smtClean="0"/>
+              <a:t>break;</a:t>
+            </a:r>
+            <a:endParaRPr lang="bg-BG" dirty="0" smtClean="0"/>
+          </a:p>
+          <a:p>
+            <a:r>
+              <a:rPr lang="bg-BG" dirty="0" smtClean="0"/>
+              <a:t>     </a:t>
+            </a:r>
+            <a:r>
+              <a:rPr lang="en-US" dirty="0" smtClean="0"/>
+              <a:t>case </a:t>
+            </a:r>
+            <a:r>
+              <a:rPr lang="en-US" dirty="0"/>
+              <a:t>7: console.log('Sunday'); break; </a:t>
+            </a:r>
+            <a:endParaRPr lang="bg-BG" dirty="0" smtClean="0"/>
+          </a:p>
+          <a:p>
+            <a:r>
+              <a:rPr lang="bg-BG" dirty="0" smtClean="0"/>
+              <a:t>     </a:t>
+            </a:r>
+            <a:r>
+              <a:rPr lang="en-US" dirty="0" smtClean="0"/>
+              <a:t>default</a:t>
+            </a:r>
+            <a:r>
+              <a:rPr lang="en-US" dirty="0"/>
+              <a:t>: console.log('Error!'); break; </a:t>
+            </a:r>
+            <a:endParaRPr lang="bg-BG" dirty="0" smtClean="0"/>
+          </a:p>
+          <a:p>
+            <a:r>
+              <a:rPr lang="en-US" dirty="0" smtClean="0"/>
+              <a:t>}</a:t>
+            </a:r>
+            <a:endParaRPr lang="en-US" dirty="0"/>
+          </a:p>
+        </p:txBody>
+      </p:sp>
+    </p:spTree>
+    <p:extLst>
+      <p:ext uri="{BB962C8B-B14F-4D97-AF65-F5344CB8AC3E}">
+        <p14:creationId xmlns:p14="http://schemas.microsoft.com/office/powerpoint/2010/main" val="1936223795"/>
+      </p:ext>
+    </p:extLst>
+  </p:cSld>
+  <p:clrMapOvr>
+    <a:masterClrMapping/>
+  </p:clrMapOvr>
+</p:sld>
+</file>
+
+<file path=ppt/slides/slide12.xml><?xml version="1.0" encoding="utf-8"?>
+<p:sld xmlns:a="http://schemas.openxmlformats.org/drawingml/2006/main" xmlns:r="http://schemas.openxmlformats.org/officeDocument/2006/relationships" xmlns:p="http://schemas.openxmlformats.org/presentationml/2006/main">
+  <p:cSld>
+    <p:spTree>
+      <p:nvGrpSpPr>
+        <p:cNvPr id="1" name=""/>
+        <p:cNvGrpSpPr/>
+        <p:nvPr/>
+      </p:nvGrpSpPr>
+      <p:grpSpPr>
+        <a:xfrm>
+          <a:off x="0" y="0"/>
+          <a:ext cx="0" cy="0"/>
+          <a:chOff x="0" y="0"/>
+          <a:chExt cx="0" cy="0"/>
+        </a:xfrm>
+      </p:grpSpPr>
+      <p:sp>
+        <p:nvSpPr>
+          <p:cNvPr id="2" name="Title 1"/>
+          <p:cNvSpPr>
+            <a:spLocks noGrp="1"/>
+          </p:cNvSpPr>
+          <p:nvPr>
+            <p:ph type="title"/>
+          </p:nvPr>
+        </p:nvSpPr>
+        <p:spPr/>
+        <p:txBody>
+          <a:bodyPr/>
+          <a:lstStyle/>
+          <a:p>
+            <a:r>
+              <a:rPr lang="en-US" i="1" dirty="0" smtClean="0">
+                <a:solidFill>
+                  <a:schemeClr val="accent6">
+                    <a:lumMod val="75000"/>
+                  </a:schemeClr>
+                </a:solidFill>
+              </a:rPr>
+              <a:t>true-like</a:t>
+            </a:r>
+            <a:r>
+              <a:rPr lang="en-US" dirty="0" smtClean="0"/>
+              <a:t> &amp; </a:t>
+            </a:r>
+            <a:r>
+              <a:rPr lang="en-US" i="1" dirty="0" smtClean="0">
+                <a:solidFill>
+                  <a:schemeClr val="accent6">
+                    <a:lumMod val="75000"/>
+                  </a:schemeClr>
+                </a:solidFill>
+              </a:rPr>
+              <a:t>false-like</a:t>
+            </a:r>
+            <a:r>
+              <a:rPr lang="en-US" i="1" dirty="0" smtClean="0"/>
+              <a:t> </a:t>
+            </a:r>
+            <a:r>
+              <a:rPr lang="bg-BG" dirty="0" smtClean="0"/>
+              <a:t>стойности</a:t>
+            </a:r>
+            <a:endParaRPr lang="en-US" dirty="0"/>
+          </a:p>
+        </p:txBody>
+      </p:sp>
+      <p:sp>
+        <p:nvSpPr>
+          <p:cNvPr id="6" name="Content Placeholder 5"/>
+          <p:cNvSpPr>
+            <a:spLocks noGrp="1"/>
+          </p:cNvSpPr>
+          <p:nvPr>
+            <p:ph idx="1"/>
+          </p:nvPr>
+        </p:nvSpPr>
+        <p:spPr/>
+        <p:txBody>
+          <a:bodyPr/>
+          <a:lstStyle/>
+          <a:p>
+            <a:r>
+              <a:rPr lang="bg-BG" dirty="0" smtClean="0"/>
+              <a:t>Всеки тип в </a:t>
+            </a:r>
+            <a:r>
+              <a:rPr lang="en-US" dirty="0" smtClean="0"/>
+              <a:t>JS</a:t>
+            </a:r>
+            <a:r>
+              <a:rPr lang="bg-BG" dirty="0" smtClean="0"/>
+              <a:t> може да бъде оценяван </a:t>
+            </a:r>
+            <a:r>
+              <a:rPr lang="bg-BG" dirty="0"/>
+              <a:t>к</a:t>
+            </a:r>
+            <a:r>
+              <a:rPr lang="bg-BG" dirty="0" smtClean="0"/>
+              <a:t>ато булева променлива</a:t>
+            </a:r>
+          </a:p>
+          <a:p>
+            <a:r>
+              <a:rPr lang="bg-BG" dirty="0" smtClean="0"/>
+              <a:t>Някои стойности винаги се считат за </a:t>
+            </a:r>
+            <a:r>
+              <a:rPr lang="en-US" i="1" dirty="0" smtClean="0">
+                <a:solidFill>
+                  <a:schemeClr val="accent6">
+                    <a:lumMod val="75000"/>
+                  </a:schemeClr>
+                </a:solidFill>
+              </a:rPr>
+              <a:t>false</a:t>
+            </a:r>
+            <a:r>
+              <a:rPr lang="bg-BG" dirty="0" smtClean="0"/>
+              <a:t>: </a:t>
+            </a:r>
+            <a:r>
+              <a:rPr lang="en-US" i="1" dirty="0" smtClean="0">
+                <a:solidFill>
+                  <a:schemeClr val="accent6">
+                    <a:lumMod val="75000"/>
+                  </a:schemeClr>
+                </a:solidFill>
+              </a:rPr>
+              <a:t>false</a:t>
+            </a:r>
+            <a:r>
+              <a:rPr lang="en-US" dirty="0" smtClean="0"/>
+              <a:t>, </a:t>
+            </a:r>
+            <a:r>
+              <a:rPr lang="en-US" i="1" dirty="0" smtClean="0">
+                <a:solidFill>
+                  <a:schemeClr val="accent6">
+                    <a:lumMod val="75000"/>
+                  </a:schemeClr>
+                </a:solidFill>
+              </a:rPr>
+              <a:t>0</a:t>
+            </a:r>
+            <a:r>
+              <a:rPr lang="en-US" dirty="0" smtClean="0"/>
+              <a:t> (</a:t>
+            </a:r>
+            <a:r>
+              <a:rPr lang="bg-BG" dirty="0" smtClean="0"/>
+              <a:t>нула), </a:t>
+            </a:r>
+            <a:r>
+              <a:rPr lang="en-US" i="1" dirty="0" smtClean="0">
+                <a:solidFill>
+                  <a:schemeClr val="accent6">
+                    <a:lumMod val="75000"/>
+                  </a:schemeClr>
+                </a:solidFill>
+              </a:rPr>
+              <a:t>“”</a:t>
+            </a:r>
+            <a:r>
+              <a:rPr lang="en-US" dirty="0" smtClean="0"/>
+              <a:t>, </a:t>
+            </a:r>
+            <a:r>
+              <a:rPr lang="en-US" i="1" dirty="0" smtClean="0">
+                <a:solidFill>
+                  <a:schemeClr val="accent6">
+                    <a:lumMod val="75000"/>
+                  </a:schemeClr>
+                </a:solidFill>
+              </a:rPr>
+              <a:t>null</a:t>
+            </a:r>
+            <a:r>
+              <a:rPr lang="en-US" dirty="0" smtClean="0"/>
+              <a:t>, </a:t>
+            </a:r>
+            <a:r>
+              <a:rPr lang="en-US" i="1" dirty="0" err="1" smtClean="0">
+                <a:solidFill>
+                  <a:schemeClr val="accent6">
+                    <a:lumMod val="75000"/>
+                  </a:schemeClr>
+                </a:solidFill>
+              </a:rPr>
+              <a:t>undefined</a:t>
+            </a:r>
+            <a:r>
+              <a:rPr lang="en-US" i="1" dirty="0" err="1" smtClean="0"/>
+              <a:t>,</a:t>
+            </a:r>
+            <a:r>
+              <a:rPr lang="en-US" i="1" dirty="0" err="1" smtClean="0">
+                <a:solidFill>
+                  <a:schemeClr val="accent6">
+                    <a:lumMod val="75000"/>
+                  </a:schemeClr>
+                </a:solidFill>
+              </a:rPr>
+              <a:t>NaN</a:t>
+            </a:r>
+            <a:endParaRPr lang="en-US" i="1" dirty="0" smtClean="0">
+              <a:solidFill>
+                <a:schemeClr val="accent6">
+                  <a:lumMod val="75000"/>
+                </a:schemeClr>
+              </a:solidFill>
+            </a:endParaRPr>
+          </a:p>
+          <a:p>
+            <a:r>
+              <a:rPr lang="bg-BG" dirty="0" smtClean="0"/>
+              <a:t>Всички останали се оценяват до</a:t>
+            </a:r>
+            <a:r>
+              <a:rPr lang="en-US" dirty="0"/>
+              <a:t> </a:t>
+            </a:r>
+            <a:r>
+              <a:rPr lang="en-US" i="1" dirty="0" smtClean="0">
+                <a:solidFill>
+                  <a:schemeClr val="accent6">
+                    <a:lumMod val="75000"/>
+                  </a:schemeClr>
+                </a:solidFill>
+              </a:rPr>
+              <a:t>true</a:t>
+            </a:r>
+          </a:p>
+          <a:p>
+            <a:r>
+              <a:rPr lang="bg-BG" dirty="0">
+                <a:hlinkClick r:id="rId2"/>
+              </a:rPr>
+              <a:t>Прочетете повече</a:t>
+            </a:r>
+            <a:endParaRPr lang="en-US" dirty="0"/>
+          </a:p>
+        </p:txBody>
+      </p:sp>
+    </p:spTree>
+    <p:extLst>
+      <p:ext uri="{BB962C8B-B14F-4D97-AF65-F5344CB8AC3E}">
+        <p14:creationId xmlns:p14="http://schemas.microsoft.com/office/powerpoint/2010/main" val="2311836737"/>
+      </p:ext>
+    </p:extLst>
+  </p:cSld>
+  <p:clrMapOvr>
+    <a:masterClrMapping/>
+  </p:clrMapOvr>
+</p:sld>
+</file>
+
+<file path=ppt/slides/slide13.xml><?xml version="1.0" encoding="utf-8"?>
+<p:sld xmlns:a="http://schemas.openxmlformats.org/drawingml/2006/main" xmlns:r="http://schemas.openxmlformats.org/officeDocument/2006/relationships" xmlns:p="http://schemas.openxmlformats.org/presentationml/2006/main">
+  <p:cSld>
+    <p:spTree>
+      <p:nvGrpSpPr>
+        <p:cNvPr id="1" name=""/>
+        <p:cNvGrpSpPr/>
+        <p:nvPr/>
+      </p:nvGrpSpPr>
+      <p:grpSpPr>
+        <a:xfrm>
+          <a:off x="0" y="0"/>
+          <a:ext cx="0" cy="0"/>
+          <a:chOff x="0" y="0"/>
+          <a:chExt cx="0" cy="0"/>
+        </a:xfrm>
+      </p:grpSpPr>
+      <p:pic>
+        <p:nvPicPr>
+          <p:cNvPr id="4" name="Content Placeholder 3"/>
+          <p:cNvPicPr>
+            <a:picLocks noGrp="1" noChangeAspect="1"/>
+          </p:cNvPicPr>
+          <p:nvPr>
+            <p:ph idx="1"/>
+          </p:nvPr>
+        </p:nvPicPr>
+        <p:blipFill>
+          <a:blip r:embed="rId2">
+            <a:extLst>
+              <a:ext uri="{28A0092B-C50C-407E-A947-70E740481C1C}">
+                <a14:useLocalDpi xmlns:a14="http://schemas.microsoft.com/office/drawing/2010/main" val="0"/>
+              </a:ext>
+            </a:extLst>
+          </a:blip>
+          <a:stretch>
+            <a:fillRect/>
+          </a:stretch>
+        </p:blipFill>
+        <p:spPr>
+          <a:xfrm>
+            <a:off x="3862422" y="506026"/>
+            <a:ext cx="4766673" cy="5934509"/>
+          </a:xfrm>
+        </p:spPr>
+      </p:pic>
+    </p:spTree>
+    <p:extLst>
+      <p:ext uri="{BB962C8B-B14F-4D97-AF65-F5344CB8AC3E}">
+        <p14:creationId xmlns:p14="http://schemas.microsoft.com/office/powerpoint/2010/main" val="475375314"/>
+      </p:ext>
+    </p:extLst>
+  </p:cSld>
+  <p:clrMapOvr>
+    <a:masterClrMapping/>
+  </p:clrMapOvr>
+  <p:timing>
+    <p:tnLst>
+      <p:par>
+        <p:cTn id="1" dur="indefinite" restart="never" nodeType="tmRoot"/>
+      </p:par>
+    </p:tnLst>
+  </p:timing>
+</p:sld>
+</file>
+
+<file path=ppt/slides/slide14.xml><?xml version="1.0" encoding="utf-8"?>
+<p:sld xmlns:a="http://schemas.openxmlformats.org/drawingml/2006/main" xmlns:r="http://schemas.openxmlformats.org/officeDocument/2006/relationships" xmlns:p="http://schemas.openxmlformats.org/presentationml/2006/main">
+  <p:cSld>
+    <p:spTree>
+      <p:nvGrpSpPr>
+        <p:cNvPr id="1" name=""/>
+        <p:cNvGrpSpPr/>
+        <p:nvPr/>
+      </p:nvGrpSpPr>
+      <p:grpSpPr>
+        <a:xfrm>
+          <a:off x="0" y="0"/>
+          <a:ext cx="0" cy="0"/>
+          <a:chOff x="0" y="0"/>
+          <a:chExt cx="0" cy="0"/>
+        </a:xfrm>
+      </p:grpSpPr>
+      <p:sp>
+        <p:nvSpPr>
+          <p:cNvPr id="2" name="Title 1"/>
+          <p:cNvSpPr>
+            <a:spLocks noGrp="1"/>
+          </p:cNvSpPr>
+          <p:nvPr>
+            <p:ph type="title"/>
+          </p:nvPr>
+        </p:nvSpPr>
+        <p:spPr/>
+        <p:txBody>
+          <a:bodyPr/>
+          <a:lstStyle/>
+          <a:p>
+            <a:r>
+              <a:rPr lang="bg-BG" dirty="0" smtClean="0"/>
+              <a:t>Домашна работа</a:t>
+            </a:r>
+            <a:endParaRPr lang="en-US" dirty="0"/>
+          </a:p>
+        </p:txBody>
+      </p:sp>
+      <p:sp>
+        <p:nvSpPr>
+          <p:cNvPr id="3" name="Content Placeholder 2"/>
+          <p:cNvSpPr>
+            <a:spLocks noGrp="1"/>
+          </p:cNvSpPr>
+          <p:nvPr>
+            <p:ph idx="1"/>
+          </p:nvPr>
+        </p:nvSpPr>
+        <p:spPr/>
+        <p:txBody>
+          <a:bodyPr anchor="ctr" anchorCtr="0">
+            <a:normAutofit fontScale="92500" lnSpcReduction="20000"/>
+          </a:bodyPr>
+          <a:lstStyle/>
+          <a:p>
+            <a:pPr marL="457200" indent="-457200">
+              <a:buFont typeface="+mj-lt"/>
+              <a:buAutoNum type="arabicPeriod"/>
+            </a:pPr>
+            <a:r>
+              <a:rPr lang="bg-BG" dirty="0" smtClean="0"/>
+              <a:t>Напишете </a:t>
+            </a:r>
+            <a:r>
+              <a:rPr lang="en-US" dirty="0" smtClean="0"/>
+              <a:t>JS</a:t>
+            </a:r>
+            <a:r>
+              <a:rPr lang="bg-BG" dirty="0"/>
+              <a:t> </a:t>
+            </a:r>
+            <a:r>
+              <a:rPr lang="bg-BG" dirty="0" smtClean="0"/>
+              <a:t>код, който по зададена цифра, изписва нейното наименование. Например: 1 -&gt; </a:t>
+            </a:r>
+            <a:r>
+              <a:rPr lang="en-US" dirty="0" smtClean="0"/>
+              <a:t>one</a:t>
+            </a:r>
+            <a:endParaRPr lang="bg-BG" dirty="0" smtClean="0"/>
+          </a:p>
+          <a:p>
+            <a:pPr marL="457200" indent="-457200">
+              <a:buFont typeface="+mj-lt"/>
+              <a:buAutoNum type="arabicPeriod"/>
+            </a:pPr>
+            <a:r>
+              <a:rPr lang="bg-BG" dirty="0" smtClean="0"/>
+              <a:t>Напишете </a:t>
+            </a:r>
+            <a:r>
+              <a:rPr lang="en-US" dirty="0" smtClean="0"/>
+              <a:t>JS </a:t>
+            </a:r>
+            <a:r>
+              <a:rPr lang="bg-BG" dirty="0" smtClean="0"/>
+              <a:t>код, който по задедени 3 числа намира най-малкото</a:t>
+            </a:r>
+          </a:p>
+          <a:p>
+            <a:pPr marL="457200" indent="-457200">
+              <a:buFont typeface="+mj-lt"/>
+              <a:buAutoNum type="arabicPeriod"/>
+            </a:pPr>
+            <a:r>
+              <a:rPr lang="bg-BG" dirty="0" smtClean="0"/>
+              <a:t>Напишете </a:t>
+            </a:r>
+            <a:r>
+              <a:rPr lang="en-US" dirty="0" smtClean="0"/>
+              <a:t>JS</a:t>
+            </a:r>
+            <a:r>
+              <a:rPr lang="bg-BG" dirty="0" smtClean="0"/>
+              <a:t> код, който сортира 3 числа във възходящ ред</a:t>
+            </a:r>
+          </a:p>
+          <a:p>
+            <a:pPr marL="457200" indent="-457200">
+              <a:buFont typeface="+mj-lt"/>
+              <a:buAutoNum type="arabicPeriod"/>
+            </a:pPr>
+            <a:r>
+              <a:rPr lang="bg-BG" dirty="0" smtClean="0"/>
+              <a:t>Напишете </a:t>
+            </a:r>
+            <a:r>
+              <a:rPr lang="en-US" dirty="0" smtClean="0"/>
+              <a:t>JS</a:t>
+            </a:r>
+            <a:r>
+              <a:rPr lang="bg-BG" dirty="0" smtClean="0"/>
+              <a:t> код, който да намира корените на квадратно уварниение</a:t>
+            </a:r>
+            <a:r>
+              <a:rPr lang="en-US" dirty="0" smtClean="0"/>
+              <a:t>           ax^2 + </a:t>
+            </a:r>
+            <a:r>
+              <a:rPr lang="en-US" dirty="0" err="1" smtClean="0"/>
+              <a:t>bx</a:t>
+            </a:r>
+            <a:r>
+              <a:rPr lang="en-US" dirty="0" smtClean="0"/>
+              <a:t> + c = 0 </a:t>
+            </a:r>
+            <a:r>
+              <a:rPr lang="bg-BG" dirty="0" smtClean="0"/>
+              <a:t>по зададени</a:t>
+            </a:r>
+            <a:r>
+              <a:rPr lang="en-US" dirty="0" smtClean="0"/>
+              <a:t> a, b </a:t>
+            </a:r>
+            <a:r>
+              <a:rPr lang="bg-BG" dirty="0" smtClean="0"/>
+              <a:t>и </a:t>
+            </a:r>
+            <a:r>
+              <a:rPr lang="en-US" dirty="0" smtClean="0"/>
+              <a:t>c. </a:t>
+            </a:r>
+            <a:r>
+              <a:rPr lang="bg-BG" dirty="0" smtClean="0"/>
+              <a:t>*Заб.: Квадратното уравнение може да има 0,1 или 2 реални корена</a:t>
+            </a:r>
+          </a:p>
+          <a:p>
+            <a:pPr marL="457200" indent="-457200">
+              <a:buFont typeface="+mj-lt"/>
+              <a:buAutoNum type="arabicPeriod"/>
+            </a:pPr>
+            <a:r>
+              <a:rPr lang="bg-BG" dirty="0" smtClean="0"/>
+              <a:t>*Напишете програма, която конвертира дадено 3-цифрено число към неговата текстова репрезентация. Напр.: </a:t>
+            </a:r>
+            <a:r>
+              <a:rPr lang="en-US" dirty="0" smtClean="0"/>
+              <a:t>312 </a:t>
+            </a:r>
+            <a:r>
+              <a:rPr lang="bg-BG" dirty="0" smtClean="0"/>
+              <a:t>-&gt; </a:t>
+            </a:r>
+            <a:r>
+              <a:rPr lang="en-US" dirty="0" smtClean="0"/>
+              <a:t>three hundred and twelve</a:t>
+            </a:r>
+            <a:endParaRPr lang="en-US" dirty="0"/>
+          </a:p>
+        </p:txBody>
+      </p:sp>
+    </p:spTree>
+    <p:extLst>
+      <p:ext uri="{BB962C8B-B14F-4D97-AF65-F5344CB8AC3E}">
+        <p14:creationId xmlns:p14="http://schemas.microsoft.com/office/powerpoint/2010/main" val="2161688977"/>
+      </p:ext>
+    </p:extLst>
+  </p:cSld>
+  <p:clrMapOvr>
+    <a:masterClrMapping/>
+  </p:clrMapOvr>
+</p:sld>
+</file>
+
 <file path=ppt/slides/slide2.xml><?xml version="1.0" encoding="utf-8"?>
 <p:sld xmlns:a="http://schemas.openxmlformats.org/drawingml/2006/main" xmlns:r="http://schemas.openxmlformats.org/officeDocument/2006/relationships" xmlns:p="http://schemas.openxmlformats.org/presentationml/2006/main">
   <p:cSld>
@@ -8502,52 +9616,274 @@
           <a:chExt cx="0" cy="0"/>
         </a:xfrm>
       </p:grpSpPr>
-      <p:pic>
-        <p:nvPicPr>
-          <p:cNvPr id="4" name="Content Placeholder 3"/>
-          <p:cNvPicPr>
-            <a:picLocks noGrp="1" noChangeAspect="1"/>
-          </p:cNvPicPr>
+      <p:sp>
+        <p:nvSpPr>
+          <p:cNvPr id="2" name="Title 1"/>
+          <p:cNvSpPr>
+            <a:spLocks noGrp="1"/>
+          </p:cNvSpPr>
+          <p:nvPr>
+            <p:ph type="title"/>
+          </p:nvPr>
+        </p:nvSpPr>
+        <p:spPr/>
+        <p:txBody>
+          <a:bodyPr/>
+          <a:lstStyle/>
+          <a:p>
+            <a:r>
+              <a:rPr lang="bg-BG" dirty="0" smtClean="0"/>
+              <a:t>Множество </a:t>
+            </a:r>
+            <a:r>
+              <a:rPr lang="en-US" i="1" dirty="0" smtClean="0">
+                <a:solidFill>
+                  <a:schemeClr val="accent6">
+                    <a:lumMod val="75000"/>
+                  </a:schemeClr>
+                </a:solidFill>
+              </a:rPr>
+              <a:t>if-else</a:t>
+            </a:r>
+            <a:r>
+              <a:rPr lang="en-US" dirty="0" smtClean="0"/>
+              <a:t> </a:t>
+            </a:r>
+            <a:r>
+              <a:rPr lang="bg-BG" dirty="0" smtClean="0"/>
+              <a:t>конструкции</a:t>
+            </a:r>
+            <a:endParaRPr lang="en-US" dirty="0"/>
+          </a:p>
+        </p:txBody>
+      </p:sp>
+      <p:sp>
+        <p:nvSpPr>
+          <p:cNvPr id="3" name="Content Placeholder 2"/>
+          <p:cNvSpPr>
+            <a:spLocks noGrp="1"/>
+          </p:cNvSpPr>
           <p:nvPr>
             <p:ph idx="1"/>
           </p:nvPr>
-        </p:nvPicPr>
-        <p:blipFill>
-          <a:blip r:embed="rId2">
-            <a:extLst>
-              <a:ext uri="{28A0092B-C50C-407E-A947-70E740481C1C}">
-                <a14:useLocalDpi xmlns:a14="http://schemas.microsoft.com/office/drawing/2010/main" val="0"/>
-              </a:ext>
-            </a:extLst>
-          </a:blip>
-          <a:stretch>
-            <a:fillRect/>
-          </a:stretch>
-        </p:blipFill>
+        </p:nvSpPr>
         <p:spPr>
           <a:xfrm>
-            <a:off x="3862422" y="506026"/>
-            <a:ext cx="4766673" cy="5934509"/>
+            <a:off x="1484310" y="2015231"/>
+            <a:ext cx="10018713" cy="2352583"/>
           </a:xfrm>
         </p:spPr>
-      </p:pic>
+        <p:txBody>
+          <a:bodyPr/>
+          <a:lstStyle/>
+          <a:p>
+            <a:r>
+              <a:rPr lang="bg-BG" dirty="0" smtClean="0"/>
+              <a:t>Често се налага проверка на повече от 1 условие</a:t>
+            </a:r>
+          </a:p>
+          <a:p>
+            <a:r>
+              <a:rPr lang="bg-BG" dirty="0" smtClean="0"/>
+              <a:t>Може да се използва съкратено записване </a:t>
+            </a:r>
+            <a:r>
+              <a:rPr lang="en-US" dirty="0" smtClean="0"/>
+              <a:t> </a:t>
+            </a:r>
+            <a:r>
+              <a:rPr lang="en-US" i="1" dirty="0" smtClean="0">
+                <a:solidFill>
+                  <a:schemeClr val="accent6">
+                    <a:lumMod val="75000"/>
+                  </a:schemeClr>
+                </a:solidFill>
+              </a:rPr>
+              <a:t>} else if { … }</a:t>
+            </a:r>
+            <a:r>
+              <a:rPr lang="bg-BG" i="1" dirty="0" smtClean="0">
+                <a:solidFill>
+                  <a:schemeClr val="accent6">
+                    <a:lumMod val="75000"/>
+                  </a:schemeClr>
+                </a:solidFill>
+              </a:rPr>
+              <a:t> </a:t>
+            </a:r>
+            <a:r>
+              <a:rPr lang="bg-BG" dirty="0" smtClean="0"/>
+              <a:t>което е еквивалентно на влагането на </a:t>
+            </a:r>
+            <a:r>
+              <a:rPr lang="en-US" i="1" dirty="0" smtClean="0">
+                <a:solidFill>
+                  <a:schemeClr val="accent6">
+                    <a:lumMod val="75000"/>
+                  </a:schemeClr>
+                </a:solidFill>
+              </a:rPr>
+              <a:t>if</a:t>
+            </a:r>
+            <a:r>
+              <a:rPr lang="bg-BG" dirty="0" smtClean="0"/>
+              <a:t>-конструкция в </a:t>
+            </a:r>
+            <a:r>
+              <a:rPr lang="en-US" i="1" dirty="0" smtClean="0">
+                <a:solidFill>
+                  <a:schemeClr val="accent6">
+                    <a:lumMod val="75000"/>
+                  </a:schemeClr>
+                </a:solidFill>
+              </a:rPr>
+              <a:t>else</a:t>
+            </a:r>
+            <a:r>
+              <a:rPr lang="en-US" dirty="0" smtClean="0"/>
+              <a:t>-</a:t>
+            </a:r>
+            <a:r>
+              <a:rPr lang="bg-BG" dirty="0" smtClean="0"/>
+              <a:t>конструкцията</a:t>
+            </a:r>
+          </a:p>
+          <a:p>
+            <a:pPr marL="0" indent="0">
+              <a:buNone/>
+            </a:pPr>
+            <a:endParaRPr lang="en-US" dirty="0"/>
+          </a:p>
+        </p:txBody>
+      </p:sp>
+      <p:sp>
+        <p:nvSpPr>
+          <p:cNvPr id="4" name="TextBox 3"/>
+          <p:cNvSpPr txBox="1"/>
+          <p:nvPr/>
+        </p:nvSpPr>
+        <p:spPr>
+          <a:xfrm>
+            <a:off x="4487312" y="4012706"/>
+            <a:ext cx="4012707" cy="2031325"/>
+          </a:xfrm>
+          <a:prstGeom prst="rect">
+            <a:avLst/>
+          </a:prstGeom>
+        </p:spPr>
+        <p:style>
+          <a:lnRef idx="0">
+            <a:schemeClr val="accent1"/>
+          </a:lnRef>
+          <a:fillRef idx="3">
+            <a:schemeClr val="accent1"/>
+          </a:fillRef>
+          <a:effectRef idx="3">
+            <a:schemeClr val="accent1"/>
+          </a:effectRef>
+          <a:fontRef idx="minor">
+            <a:schemeClr val="lt1"/>
+          </a:fontRef>
+        </p:style>
+        <p:txBody>
+          <a:bodyPr wrap="square" rtlCol="0">
+            <a:spAutoFit/>
+          </a:bodyPr>
+          <a:lstStyle/>
+          <a:p>
+            <a:r>
+              <a:rPr lang="en-US" dirty="0" smtClean="0"/>
+              <a:t>If (expression1) </a:t>
+            </a:r>
+            <a:r>
+              <a:rPr lang="en-US" dirty="0" smtClean="0"/>
+              <a:t>{</a:t>
+            </a:r>
+            <a:endParaRPr lang="bg-BG" dirty="0" smtClean="0"/>
+          </a:p>
+          <a:p>
+            <a:r>
+              <a:rPr lang="bg-BG" dirty="0"/>
+              <a:t> </a:t>
+            </a:r>
+            <a:r>
+              <a:rPr lang="bg-BG" dirty="0" smtClean="0"/>
+              <a:t>    </a:t>
+            </a:r>
+            <a:r>
+              <a:rPr lang="en-US" dirty="0" smtClean="0"/>
+              <a:t>statement1</a:t>
+            </a:r>
+            <a:r>
+              <a:rPr lang="en-US" dirty="0" smtClean="0"/>
+              <a:t>;</a:t>
+            </a:r>
+          </a:p>
+          <a:p>
+            <a:r>
+              <a:rPr lang="en-US" dirty="0" smtClean="0"/>
+              <a:t>} </a:t>
+            </a:r>
+            <a:r>
+              <a:rPr lang="en-US" dirty="0" smtClean="0"/>
+              <a:t>else </a:t>
+            </a:r>
+            <a:r>
+              <a:rPr lang="en-US" dirty="0" smtClean="0"/>
+              <a:t>if (expression2) </a:t>
+            </a:r>
+            <a:r>
+              <a:rPr lang="en-US" dirty="0" smtClean="0"/>
+              <a:t>{</a:t>
+            </a:r>
+            <a:endParaRPr lang="en-US" dirty="0" smtClean="0"/>
+          </a:p>
+          <a:p>
+            <a:r>
+              <a:rPr lang="en-US" dirty="0"/>
+              <a:t> </a:t>
+            </a:r>
+            <a:r>
+              <a:rPr lang="en-US" dirty="0" smtClean="0"/>
+              <a:t>    </a:t>
+            </a:r>
+            <a:r>
+              <a:rPr lang="en-US" dirty="0" smtClean="0"/>
+              <a:t>statement2;</a:t>
+            </a:r>
+            <a:endParaRPr lang="en-US" dirty="0" smtClean="0"/>
+          </a:p>
+          <a:p>
+            <a:r>
+              <a:rPr lang="en-US" dirty="0" smtClean="0"/>
+              <a:t>} else {</a:t>
+            </a:r>
+          </a:p>
+          <a:p>
+            <a:r>
+              <a:rPr lang="en-US" dirty="0" smtClean="0"/>
+              <a:t>     statement3;</a:t>
+            </a:r>
+          </a:p>
+          <a:p>
+            <a:r>
+              <a:rPr lang="en-US" dirty="0" smtClean="0"/>
+              <a:t>}</a:t>
+            </a:r>
+            <a:endParaRPr lang="en-US" dirty="0"/>
+          </a:p>
+        </p:txBody>
+      </p:sp>
     </p:spTree>
     <p:extLst>
       <p:ext uri="{BB962C8B-B14F-4D97-AF65-F5344CB8AC3E}">
-        <p14:creationId xmlns:p14="http://schemas.microsoft.com/office/powerpoint/2010/main" val="475375314"/>
+        <p14:creationId xmlns:p14="http://schemas.microsoft.com/office/powerpoint/2010/main" val="3605545072"/>
       </p:ext>
     </p:extLst>
   </p:cSld>
   <p:clrMapOvr>
     <a:masterClrMapping/>
   </p:clrMapOvr>
-  <p:timing>
-    <p:tnLst>
-      <p:par>
-        <p:cTn id="1" dur="indefinite" restart="never" nodeType="tmRoot"/>
-      </p:par>
-    </p:tnLst>
-  </p:timing>
 </p:sld>
 </file>
 

</xml_diff>